<commit_message>
Reorden de los índices y cambio nombre notebooks
</commit_message>
<xml_diff>
--- a/presentaciones/01-Introducción.pptx
+++ b/presentaciones/01-Introducción.pptx
@@ -197,7 +197,7 @@
           <a:p>
             <a:fld id="{99EBDB7E-22A8-4EDB-9E23-57D60215A7DB}" type="datetimeFigureOut">
               <a:rPr lang="es-ES" smtClean="0"/>
-              <a:t>09/05/2021</a:t>
+              <a:t>22/05/2021</a:t>
             </a:fld>
             <a:endParaRPr lang="es-ES"/>
           </a:p>
@@ -780,7 +780,7 @@
           <a:graphicData uri="http://schemas.openxmlformats.org/presentationml/2006/ole">
             <mc:AlternateContent xmlns:mc="http://schemas.openxmlformats.org/markup-compatibility/2006">
               <mc:Choice xmlns:v="urn:schemas-microsoft-com:vml" Requires="v">
-                <p:oleObj spid="_x0000_s12321" name="think-cell Slide" r:id="rId4" imgW="270" imgH="270" progId="TCLayout.ActiveDocument.1">
+                <p:oleObj spid="_x0000_s12322" name="think-cell Slide" r:id="rId4" imgW="270" imgH="270" progId="TCLayout.ActiveDocument.1">
                   <p:embed/>
                 </p:oleObj>
               </mc:Choice>
@@ -1502,7 +1502,7 @@
           <p:cNvPr id="24" name="Rectangle 57">
             <a:extLst>
               <a:ext uri="{FF2B5EF4-FFF2-40B4-BE49-F238E27FC236}">
-                <a16:creationId xmlns="" xmlns:a16="http://schemas.microsoft.com/office/drawing/2014/main" id="{E84F61DF-65CA-45BF-9A0B-34B97F6A97EA}"/>
+                <a16:creationId xmlns:a16="http://schemas.microsoft.com/office/drawing/2014/main" xmlns="" id="{E84F61DF-65CA-45BF-9A0B-34B97F6A97EA}"/>
               </a:ext>
             </a:extLst>
           </p:cNvPr>
@@ -1603,7 +1603,7 @@
           <p:cNvPr id="20" name="Text Placeholder 7">
             <a:extLst>
               <a:ext uri="{FF2B5EF4-FFF2-40B4-BE49-F238E27FC236}">
-                <a16:creationId xmlns="" xmlns:a16="http://schemas.microsoft.com/office/drawing/2014/main" id="{27CE2609-37DA-4C4C-BF45-E56CE85AA41D}"/>
+                <a16:creationId xmlns:a16="http://schemas.microsoft.com/office/drawing/2014/main" xmlns="" id="{27CE2609-37DA-4C4C-BF45-E56CE85AA41D}"/>
               </a:ext>
             </a:extLst>
           </p:cNvPr>
@@ -1725,7 +1725,7 @@
           <p:cNvPr id="29" name="Text Placeholder 7">
             <a:extLst>
               <a:ext uri="{FF2B5EF4-FFF2-40B4-BE49-F238E27FC236}">
-                <a16:creationId xmlns="" xmlns:a16="http://schemas.microsoft.com/office/drawing/2014/main" id="{27CE2609-37DA-4C4C-BF45-E56CE85AA41D}"/>
+                <a16:creationId xmlns:a16="http://schemas.microsoft.com/office/drawing/2014/main" xmlns="" id="{27CE2609-37DA-4C4C-BF45-E56CE85AA41D}"/>
               </a:ext>
             </a:extLst>
           </p:cNvPr>
@@ -1847,7 +1847,7 @@
           <p:cNvPr id="30" name="Text Placeholder 7">
             <a:extLst>
               <a:ext uri="{FF2B5EF4-FFF2-40B4-BE49-F238E27FC236}">
-                <a16:creationId xmlns="" xmlns:a16="http://schemas.microsoft.com/office/drawing/2014/main" id="{27CE2609-37DA-4C4C-BF45-E56CE85AA41D}"/>
+                <a16:creationId xmlns:a16="http://schemas.microsoft.com/office/drawing/2014/main" xmlns="" id="{27CE2609-37DA-4C4C-BF45-E56CE85AA41D}"/>
               </a:ext>
             </a:extLst>
           </p:cNvPr>
@@ -2270,7 +2270,7 @@
           <p:cNvPr id="8" name="Text Placeholder 7">
             <a:extLst>
               <a:ext uri="{FF2B5EF4-FFF2-40B4-BE49-F238E27FC236}">
-                <a16:creationId xmlns="" xmlns:a16="http://schemas.microsoft.com/office/drawing/2014/main" id="{27CE2609-37DA-4C4C-BF45-E56CE85AA41D}"/>
+                <a16:creationId xmlns:a16="http://schemas.microsoft.com/office/drawing/2014/main" xmlns="" id="{27CE2609-37DA-4C4C-BF45-E56CE85AA41D}"/>
               </a:ext>
             </a:extLst>
           </p:cNvPr>
@@ -2384,7 +2384,7 @@
           <p:cNvPr id="13" name="Text Placeholder 7">
             <a:extLst>
               <a:ext uri="{FF2B5EF4-FFF2-40B4-BE49-F238E27FC236}">
-                <a16:creationId xmlns="" xmlns:a16="http://schemas.microsoft.com/office/drawing/2014/main" id="{D8D7F005-BA7C-423E-87B0-6782D88233F6}"/>
+                <a16:creationId xmlns:a16="http://schemas.microsoft.com/office/drawing/2014/main" xmlns="" id="{D8D7F005-BA7C-423E-87B0-6782D88233F6}"/>
               </a:ext>
             </a:extLst>
           </p:cNvPr>
@@ -2458,7 +2458,7 @@
           <p:cNvPr id="14" name="Text Placeholder 7">
             <a:extLst>
               <a:ext uri="{FF2B5EF4-FFF2-40B4-BE49-F238E27FC236}">
-                <a16:creationId xmlns="" xmlns:a16="http://schemas.microsoft.com/office/drawing/2014/main" id="{47BDC0DA-1585-454D-9E74-41D2AFC0FEE5}"/>
+                <a16:creationId xmlns:a16="http://schemas.microsoft.com/office/drawing/2014/main" xmlns="" id="{47BDC0DA-1585-454D-9E74-41D2AFC0FEE5}"/>
               </a:ext>
             </a:extLst>
           </p:cNvPr>
@@ -2560,7 +2560,7 @@
           <p:cNvPr id="16" name="Text Placeholder 7">
             <a:extLst>
               <a:ext uri="{FF2B5EF4-FFF2-40B4-BE49-F238E27FC236}">
-                <a16:creationId xmlns="" xmlns:a16="http://schemas.microsoft.com/office/drawing/2014/main" id="{27CE2609-37DA-4C4C-BF45-E56CE85AA41D}"/>
+                <a16:creationId xmlns:a16="http://schemas.microsoft.com/office/drawing/2014/main" xmlns="" id="{27CE2609-37DA-4C4C-BF45-E56CE85AA41D}"/>
               </a:ext>
             </a:extLst>
           </p:cNvPr>
@@ -2727,7 +2727,7 @@
           <p:cNvPr id="3" name="Text Placeholder 7">
             <a:extLst>
               <a:ext uri="{FF2B5EF4-FFF2-40B4-BE49-F238E27FC236}">
-                <a16:creationId xmlns="" xmlns:a16="http://schemas.microsoft.com/office/drawing/2014/main" id="{27CE2609-37DA-4C4C-BF45-E56CE85AA41D}"/>
+                <a16:creationId xmlns:a16="http://schemas.microsoft.com/office/drawing/2014/main" xmlns="" id="{27CE2609-37DA-4C4C-BF45-E56CE85AA41D}"/>
               </a:ext>
             </a:extLst>
           </p:cNvPr>
@@ -2841,7 +2841,7 @@
           <p:cNvPr id="4" name="Text Placeholder 7">
             <a:extLst>
               <a:ext uri="{FF2B5EF4-FFF2-40B4-BE49-F238E27FC236}">
-                <a16:creationId xmlns="" xmlns:a16="http://schemas.microsoft.com/office/drawing/2014/main" id="{D8D7F005-BA7C-423E-87B0-6782D88233F6}"/>
+                <a16:creationId xmlns:a16="http://schemas.microsoft.com/office/drawing/2014/main" xmlns="" id="{D8D7F005-BA7C-423E-87B0-6782D88233F6}"/>
               </a:ext>
             </a:extLst>
           </p:cNvPr>
@@ -2927,7 +2927,7 @@
           <p:cNvPr id="9" name="Text Placeholder 7">
             <a:extLst>
               <a:ext uri="{FF2B5EF4-FFF2-40B4-BE49-F238E27FC236}">
-                <a16:creationId xmlns="" xmlns:a16="http://schemas.microsoft.com/office/drawing/2014/main" id="{27CE2609-37DA-4C4C-BF45-E56CE85AA41D}"/>
+                <a16:creationId xmlns:a16="http://schemas.microsoft.com/office/drawing/2014/main" xmlns="" id="{27CE2609-37DA-4C4C-BF45-E56CE85AA41D}"/>
               </a:ext>
             </a:extLst>
           </p:cNvPr>
@@ -3041,7 +3041,7 @@
           <p:cNvPr id="10" name="Text Placeholder 7">
             <a:extLst>
               <a:ext uri="{FF2B5EF4-FFF2-40B4-BE49-F238E27FC236}">
-                <a16:creationId xmlns="" xmlns:a16="http://schemas.microsoft.com/office/drawing/2014/main" id="{D8D7F005-BA7C-423E-87B0-6782D88233F6}"/>
+                <a16:creationId xmlns:a16="http://schemas.microsoft.com/office/drawing/2014/main" xmlns="" id="{D8D7F005-BA7C-423E-87B0-6782D88233F6}"/>
               </a:ext>
             </a:extLst>
           </p:cNvPr>
@@ -3127,7 +3127,7 @@
           <p:cNvPr id="11" name="Text Placeholder 7">
             <a:extLst>
               <a:ext uri="{FF2B5EF4-FFF2-40B4-BE49-F238E27FC236}">
-                <a16:creationId xmlns="" xmlns:a16="http://schemas.microsoft.com/office/drawing/2014/main" id="{27CE2609-37DA-4C4C-BF45-E56CE85AA41D}"/>
+                <a16:creationId xmlns:a16="http://schemas.microsoft.com/office/drawing/2014/main" xmlns="" id="{27CE2609-37DA-4C4C-BF45-E56CE85AA41D}"/>
               </a:ext>
             </a:extLst>
           </p:cNvPr>
@@ -3241,7 +3241,7 @@
           <p:cNvPr id="12" name="Text Placeholder 7">
             <a:extLst>
               <a:ext uri="{FF2B5EF4-FFF2-40B4-BE49-F238E27FC236}">
-                <a16:creationId xmlns="" xmlns:a16="http://schemas.microsoft.com/office/drawing/2014/main" id="{D8D7F005-BA7C-423E-87B0-6782D88233F6}"/>
+                <a16:creationId xmlns:a16="http://schemas.microsoft.com/office/drawing/2014/main" xmlns="" id="{D8D7F005-BA7C-423E-87B0-6782D88233F6}"/>
               </a:ext>
             </a:extLst>
           </p:cNvPr>
@@ -3372,7 +3372,7 @@
           <a:graphicData uri="http://schemas.openxmlformats.org/presentationml/2006/ole">
             <mc:AlternateContent xmlns:mc="http://schemas.openxmlformats.org/markup-compatibility/2006">
               <mc:Choice xmlns:v="urn:schemas-microsoft-com:vml" Requires="v">
-                <p:oleObj spid="_x0000_s14364" name="think-cell Slide" r:id="rId4" imgW="270" imgH="270" progId="TCLayout.ActiveDocument.1">
+                <p:oleObj spid="_x0000_s14365" name="think-cell Slide" r:id="rId4" imgW="270" imgH="270" progId="TCLayout.ActiveDocument.1">
                   <p:embed/>
                 </p:oleObj>
               </mc:Choice>
@@ -3840,7 +3840,7 @@
           <p:cNvPr id="12" name="Freeform: Shape 11">
             <a:extLst>
               <a:ext uri="{FF2B5EF4-FFF2-40B4-BE49-F238E27FC236}">
-                <a16:creationId xmlns="" xmlns:a16="http://schemas.microsoft.com/office/drawing/2014/main" id="{F5F5AEA1-6A77-4676-B8B3-EF658F5F8430}"/>
+                <a16:creationId xmlns:a16="http://schemas.microsoft.com/office/drawing/2014/main" xmlns="" id="{F5F5AEA1-6A77-4676-B8B3-EF658F5F8430}"/>
               </a:ext>
             </a:extLst>
           </p:cNvPr>
@@ -4033,7 +4033,7 @@
           <p:cNvPr id="26" name="Text Placeholder 4">
             <a:extLst>
               <a:ext uri="{FF2B5EF4-FFF2-40B4-BE49-F238E27FC236}">
-                <a16:creationId xmlns="" xmlns:a16="http://schemas.microsoft.com/office/drawing/2014/main" id="{7E551D69-F21D-4601-B4BD-97ECB52F39D6}"/>
+                <a16:creationId xmlns:a16="http://schemas.microsoft.com/office/drawing/2014/main" xmlns="" id="{7E551D69-F21D-4601-B4BD-97ECB52F39D6}"/>
               </a:ext>
             </a:extLst>
           </p:cNvPr>
@@ -4093,7 +4093,7 @@
           <p:cNvPr id="23" name="Text Placeholder 4">
             <a:extLst>
               <a:ext uri="{FF2B5EF4-FFF2-40B4-BE49-F238E27FC236}">
-                <a16:creationId xmlns="" xmlns:a16="http://schemas.microsoft.com/office/drawing/2014/main" id="{BC359575-5CC3-4B2F-91E7-19D6A150BE7B}"/>
+                <a16:creationId xmlns:a16="http://schemas.microsoft.com/office/drawing/2014/main" xmlns="" id="{BC359575-5CC3-4B2F-91E7-19D6A150BE7B}"/>
               </a:ext>
             </a:extLst>
           </p:cNvPr>
@@ -4153,7 +4153,7 @@
           <p:cNvPr id="24" name="Text Placeholder 7">
             <a:extLst>
               <a:ext uri="{FF2B5EF4-FFF2-40B4-BE49-F238E27FC236}">
-                <a16:creationId xmlns="" xmlns:a16="http://schemas.microsoft.com/office/drawing/2014/main" id="{53745724-67BB-4475-9660-FEEE12268615}"/>
+                <a16:creationId xmlns:a16="http://schemas.microsoft.com/office/drawing/2014/main" xmlns="" id="{53745724-67BB-4475-9660-FEEE12268615}"/>
               </a:ext>
             </a:extLst>
           </p:cNvPr>
@@ -4227,7 +4227,7 @@
           <p:cNvPr id="27" name="Text Placeholder 7">
             <a:extLst>
               <a:ext uri="{FF2B5EF4-FFF2-40B4-BE49-F238E27FC236}">
-                <a16:creationId xmlns="" xmlns:a16="http://schemas.microsoft.com/office/drawing/2014/main" id="{C78431F2-3F85-4748-A6BC-A08250A6D354}"/>
+                <a16:creationId xmlns:a16="http://schemas.microsoft.com/office/drawing/2014/main" xmlns="" id="{C78431F2-3F85-4748-A6BC-A08250A6D354}"/>
               </a:ext>
             </a:extLst>
           </p:cNvPr>
@@ -4301,7 +4301,7 @@
           <p:cNvPr id="13" name="Oval 20">
             <a:extLst>
               <a:ext uri="{FF2B5EF4-FFF2-40B4-BE49-F238E27FC236}">
-                <a16:creationId xmlns="" xmlns:a16="http://schemas.microsoft.com/office/drawing/2014/main" id="{1EFB3510-D39A-47CF-8191-109DDF9E53D5}"/>
+                <a16:creationId xmlns:a16="http://schemas.microsoft.com/office/drawing/2014/main" xmlns="" id="{1EFB3510-D39A-47CF-8191-109DDF9E53D5}"/>
               </a:ext>
             </a:extLst>
           </p:cNvPr>
@@ -4561,7 +4561,7 @@
           <a:graphicData uri="http://schemas.openxmlformats.org/presentationml/2006/ole">
             <mc:AlternateContent xmlns:mc="http://schemas.openxmlformats.org/markup-compatibility/2006">
               <mc:Choice xmlns:v="urn:schemas-microsoft-com:vml" Requires="v">
-                <p:oleObj spid="_x0000_s15388" name="think-cell Slide" r:id="rId4" imgW="270" imgH="270" progId="TCLayout.ActiveDocument.1">
+                <p:oleObj spid="_x0000_s15389" name="think-cell Slide" r:id="rId4" imgW="270" imgH="270" progId="TCLayout.ActiveDocument.1">
                   <p:embed/>
                 </p:oleObj>
               </mc:Choice>
@@ -4670,7 +4670,7 @@
           <p:cNvPr id="3" name="Freeform: Shape 9">
             <a:extLst>
               <a:ext uri="{FF2B5EF4-FFF2-40B4-BE49-F238E27FC236}">
-                <a16:creationId xmlns="" xmlns:a16="http://schemas.microsoft.com/office/drawing/2014/main" id="{531E77B6-0DD5-446F-A826-892DFC23D785}"/>
+                <a16:creationId xmlns:a16="http://schemas.microsoft.com/office/drawing/2014/main" xmlns="" id="{531E77B6-0DD5-446F-A826-892DFC23D785}"/>
               </a:ext>
             </a:extLst>
           </p:cNvPr>
@@ -4843,7 +4843,7 @@
           <p:cNvPr id="7" name="Retângulo 43">
             <a:extLst>
               <a:ext uri="{FF2B5EF4-FFF2-40B4-BE49-F238E27FC236}">
-                <a16:creationId xmlns="" xmlns:a16="http://schemas.microsoft.com/office/drawing/2014/main" id="{25FC8637-25BD-4C09-AF25-56B4243DAB3D}"/>
+                <a16:creationId xmlns:a16="http://schemas.microsoft.com/office/drawing/2014/main" xmlns="" id="{25FC8637-25BD-4C09-AF25-56B4243DAB3D}"/>
               </a:ext>
             </a:extLst>
           </p:cNvPr>
@@ -4894,7 +4894,7 @@
           <p:cNvPr id="8" name="Text Placeholder 7">
             <a:extLst>
               <a:ext uri="{FF2B5EF4-FFF2-40B4-BE49-F238E27FC236}">
-                <a16:creationId xmlns="" xmlns:a16="http://schemas.microsoft.com/office/drawing/2014/main" id="{E824319D-02CC-441E-87B5-E9D15DE8CA35}"/>
+                <a16:creationId xmlns:a16="http://schemas.microsoft.com/office/drawing/2014/main" xmlns="" id="{E824319D-02CC-441E-87B5-E9D15DE8CA35}"/>
               </a:ext>
             </a:extLst>
           </p:cNvPr>
@@ -5506,7 +5506,7 @@
           <a:graphicData uri="http://schemas.openxmlformats.org/presentationml/2006/ole">
             <mc:AlternateContent xmlns:mc="http://schemas.openxmlformats.org/markup-compatibility/2006">
               <mc:Choice xmlns:v="urn:schemas-microsoft-com:vml" Requires="v">
-                <p:oleObj spid="_x0000_s16412" name="think-cell Slide" r:id="rId4" imgW="270" imgH="270" progId="TCLayout.ActiveDocument.1">
+                <p:oleObj spid="_x0000_s16413" name="think-cell Slide" r:id="rId4" imgW="270" imgH="270" progId="TCLayout.ActiveDocument.1">
                   <p:embed/>
                 </p:oleObj>
               </mc:Choice>
@@ -5565,7 +5565,7 @@
           <p:cNvPr id="13" name="Rectangle 12">
             <a:extLst>
               <a:ext uri="{FF2B5EF4-FFF2-40B4-BE49-F238E27FC236}">
-                <a16:creationId xmlns="" xmlns:a16="http://schemas.microsoft.com/office/drawing/2014/main" id="{9455EBB8-DB3C-45D2-B02F-0B36A58E555B}"/>
+                <a16:creationId xmlns:a16="http://schemas.microsoft.com/office/drawing/2014/main" xmlns="" id="{9455EBB8-DB3C-45D2-B02F-0B36A58E555B}"/>
               </a:ext>
             </a:extLst>
           </p:cNvPr>
@@ -5855,7 +5855,7 @@
           <p:cNvPr id="14" name="Text Placeholder 7">
             <a:extLst>
               <a:ext uri="{FF2B5EF4-FFF2-40B4-BE49-F238E27FC236}">
-                <a16:creationId xmlns="" xmlns:a16="http://schemas.microsoft.com/office/drawing/2014/main" id="{9949BCD6-E419-4ED2-9061-402DD5FF2406}"/>
+                <a16:creationId xmlns:a16="http://schemas.microsoft.com/office/drawing/2014/main" xmlns="" id="{9949BCD6-E419-4ED2-9061-402DD5FF2406}"/>
               </a:ext>
             </a:extLst>
           </p:cNvPr>
@@ -5946,7 +5946,7 @@
           <p:cNvPr id="15" name="Text Placeholder 4">
             <a:extLst>
               <a:ext uri="{FF2B5EF4-FFF2-40B4-BE49-F238E27FC236}">
-                <a16:creationId xmlns="" xmlns:a16="http://schemas.microsoft.com/office/drawing/2014/main" id="{3F6EE60C-2261-45A0-AD6F-B5F767C57B57}"/>
+                <a16:creationId xmlns:a16="http://schemas.microsoft.com/office/drawing/2014/main" xmlns="" id="{3F6EE60C-2261-45A0-AD6F-B5F767C57B57}"/>
               </a:ext>
             </a:extLst>
           </p:cNvPr>
@@ -6006,7 +6006,7 @@
           <p:cNvPr id="16" name="Text Placeholder 7">
             <a:extLst>
               <a:ext uri="{FF2B5EF4-FFF2-40B4-BE49-F238E27FC236}">
-                <a16:creationId xmlns="" xmlns:a16="http://schemas.microsoft.com/office/drawing/2014/main" id="{ABE7F41D-73F9-4353-AE3F-71AB8377048D}"/>
+                <a16:creationId xmlns:a16="http://schemas.microsoft.com/office/drawing/2014/main" xmlns="" id="{ABE7F41D-73F9-4353-AE3F-71AB8377048D}"/>
               </a:ext>
             </a:extLst>
           </p:cNvPr>
@@ -6097,7 +6097,7 @@
           <p:cNvPr id="17" name="Text Placeholder 4">
             <a:extLst>
               <a:ext uri="{FF2B5EF4-FFF2-40B4-BE49-F238E27FC236}">
-                <a16:creationId xmlns="" xmlns:a16="http://schemas.microsoft.com/office/drawing/2014/main" id="{83D9B326-443F-495A-B788-21C48AC85AE2}"/>
+                <a16:creationId xmlns:a16="http://schemas.microsoft.com/office/drawing/2014/main" xmlns="" id="{83D9B326-443F-495A-B788-21C48AC85AE2}"/>
               </a:ext>
             </a:extLst>
           </p:cNvPr>
@@ -6157,7 +6157,7 @@
           <p:cNvPr id="18" name="Text Placeholder 7">
             <a:extLst>
               <a:ext uri="{FF2B5EF4-FFF2-40B4-BE49-F238E27FC236}">
-                <a16:creationId xmlns="" xmlns:a16="http://schemas.microsoft.com/office/drawing/2014/main" id="{00358894-025F-4D0E-AF6E-F99EDF29800A}"/>
+                <a16:creationId xmlns:a16="http://schemas.microsoft.com/office/drawing/2014/main" xmlns="" id="{00358894-025F-4D0E-AF6E-F99EDF29800A}"/>
               </a:ext>
             </a:extLst>
           </p:cNvPr>
@@ -6248,7 +6248,7 @@
           <p:cNvPr id="19" name="Text Placeholder 4">
             <a:extLst>
               <a:ext uri="{FF2B5EF4-FFF2-40B4-BE49-F238E27FC236}">
-                <a16:creationId xmlns="" xmlns:a16="http://schemas.microsoft.com/office/drawing/2014/main" id="{EE5AF299-5A92-48E3-B18F-F7FE7AB9EED4}"/>
+                <a16:creationId xmlns:a16="http://schemas.microsoft.com/office/drawing/2014/main" xmlns="" id="{EE5AF299-5A92-48E3-B18F-F7FE7AB9EED4}"/>
               </a:ext>
             </a:extLst>
           </p:cNvPr>
@@ -6308,7 +6308,7 @@
           <p:cNvPr id="20" name="Text Placeholder 7">
             <a:extLst>
               <a:ext uri="{FF2B5EF4-FFF2-40B4-BE49-F238E27FC236}">
-                <a16:creationId xmlns="" xmlns:a16="http://schemas.microsoft.com/office/drawing/2014/main" id="{F951F368-6540-4675-9A52-0824638E0EF4}"/>
+                <a16:creationId xmlns:a16="http://schemas.microsoft.com/office/drawing/2014/main" xmlns="" id="{F951F368-6540-4675-9A52-0824638E0EF4}"/>
               </a:ext>
             </a:extLst>
           </p:cNvPr>
@@ -6399,7 +6399,7 @@
           <p:cNvPr id="21" name="Text Placeholder 4">
             <a:extLst>
               <a:ext uri="{FF2B5EF4-FFF2-40B4-BE49-F238E27FC236}">
-                <a16:creationId xmlns="" xmlns:a16="http://schemas.microsoft.com/office/drawing/2014/main" id="{B7C16A20-D927-494E-94A9-49AF2E1FA010}"/>
+                <a16:creationId xmlns:a16="http://schemas.microsoft.com/office/drawing/2014/main" xmlns="" id="{B7C16A20-D927-494E-94A9-49AF2E1FA010}"/>
               </a:ext>
             </a:extLst>
           </p:cNvPr>
@@ -6459,7 +6459,7 @@
           <p:cNvPr id="22" name="Text Placeholder 4">
             <a:extLst>
               <a:ext uri="{FF2B5EF4-FFF2-40B4-BE49-F238E27FC236}">
-                <a16:creationId xmlns="" xmlns:a16="http://schemas.microsoft.com/office/drawing/2014/main" id="{936BACCD-6FBF-486E-81CB-3462560DA2CE}"/>
+                <a16:creationId xmlns:a16="http://schemas.microsoft.com/office/drawing/2014/main" xmlns="" id="{936BACCD-6FBF-486E-81CB-3462560DA2CE}"/>
               </a:ext>
             </a:extLst>
           </p:cNvPr>
@@ -6519,7 +6519,7 @@
           <p:cNvPr id="23" name="Text Placeholder 4">
             <a:extLst>
               <a:ext uri="{FF2B5EF4-FFF2-40B4-BE49-F238E27FC236}">
-                <a16:creationId xmlns="" xmlns:a16="http://schemas.microsoft.com/office/drawing/2014/main" id="{48E9C506-31EA-4D04-B660-3B4DB0704112}"/>
+                <a16:creationId xmlns:a16="http://schemas.microsoft.com/office/drawing/2014/main" xmlns="" id="{48E9C506-31EA-4D04-B660-3B4DB0704112}"/>
               </a:ext>
             </a:extLst>
           </p:cNvPr>
@@ -6778,7 +6778,7 @@
           <a:graphicData uri="http://schemas.openxmlformats.org/presentationml/2006/ole">
             <mc:AlternateContent xmlns:mc="http://schemas.openxmlformats.org/markup-compatibility/2006">
               <mc:Choice xmlns:v="urn:schemas-microsoft-com:vml" Requires="v">
-                <p:oleObj spid="_x0000_s17436" name="think-cell Slide" r:id="rId4" imgW="270" imgH="270" progId="TCLayout.ActiveDocument.1">
+                <p:oleObj spid="_x0000_s17437" name="think-cell Slide" r:id="rId4" imgW="270" imgH="270" progId="TCLayout.ActiveDocument.1">
                   <p:embed/>
                 </p:oleObj>
               </mc:Choice>
@@ -6905,7 +6905,7 @@
           <a:graphicData uri="http://schemas.openxmlformats.org/presentationml/2006/ole">
             <mc:AlternateContent xmlns:mc="http://schemas.openxmlformats.org/markup-compatibility/2006">
               <mc:Choice xmlns:v="urn:schemas-microsoft-com:vml" Requires="v">
-                <p:oleObj spid="_x0000_s18460" name="think-cell Slide" r:id="rId4" imgW="270" imgH="270" progId="TCLayout.ActiveDocument.1">
+                <p:oleObj spid="_x0000_s18461" name="think-cell Slide" r:id="rId4" imgW="270" imgH="270" progId="TCLayout.ActiveDocument.1">
                   <p:embed/>
                 </p:oleObj>
               </mc:Choice>
@@ -7450,7 +7450,7 @@
           <p:cNvPr id="24" name="Rectangle 57">
             <a:extLst>
               <a:ext uri="{FF2B5EF4-FFF2-40B4-BE49-F238E27FC236}">
-                <a16:creationId xmlns="" xmlns:a16="http://schemas.microsoft.com/office/drawing/2014/main" id="{E84F61DF-65CA-45BF-9A0B-34B97F6A97EA}"/>
+                <a16:creationId xmlns:a16="http://schemas.microsoft.com/office/drawing/2014/main" xmlns="" id="{E84F61DF-65CA-45BF-9A0B-34B97F6A97EA}"/>
               </a:ext>
             </a:extLst>
           </p:cNvPr>
@@ -7551,7 +7551,7 @@
           <p:cNvPr id="20" name="Text Placeholder 7">
             <a:extLst>
               <a:ext uri="{FF2B5EF4-FFF2-40B4-BE49-F238E27FC236}">
-                <a16:creationId xmlns="" xmlns:a16="http://schemas.microsoft.com/office/drawing/2014/main" id="{27CE2609-37DA-4C4C-BF45-E56CE85AA41D}"/>
+                <a16:creationId xmlns:a16="http://schemas.microsoft.com/office/drawing/2014/main" xmlns="" id="{27CE2609-37DA-4C4C-BF45-E56CE85AA41D}"/>
               </a:ext>
             </a:extLst>
           </p:cNvPr>
@@ -7673,7 +7673,7 @@
           <p:cNvPr id="29" name="Text Placeholder 7">
             <a:extLst>
               <a:ext uri="{FF2B5EF4-FFF2-40B4-BE49-F238E27FC236}">
-                <a16:creationId xmlns="" xmlns:a16="http://schemas.microsoft.com/office/drawing/2014/main" id="{27CE2609-37DA-4C4C-BF45-E56CE85AA41D}"/>
+                <a16:creationId xmlns:a16="http://schemas.microsoft.com/office/drawing/2014/main" xmlns="" id="{27CE2609-37DA-4C4C-BF45-E56CE85AA41D}"/>
               </a:ext>
             </a:extLst>
           </p:cNvPr>
@@ -7795,7 +7795,7 @@
           <p:cNvPr id="30" name="Text Placeholder 7">
             <a:extLst>
               <a:ext uri="{FF2B5EF4-FFF2-40B4-BE49-F238E27FC236}">
-                <a16:creationId xmlns="" xmlns:a16="http://schemas.microsoft.com/office/drawing/2014/main" id="{27CE2609-37DA-4C4C-BF45-E56CE85AA41D}"/>
+                <a16:creationId xmlns:a16="http://schemas.microsoft.com/office/drawing/2014/main" xmlns="" id="{27CE2609-37DA-4C4C-BF45-E56CE85AA41D}"/>
               </a:ext>
             </a:extLst>
           </p:cNvPr>
@@ -8233,7 +8233,7 @@
           <p:cNvPr id="24" name="Rectangle 57">
             <a:extLst>
               <a:ext uri="{FF2B5EF4-FFF2-40B4-BE49-F238E27FC236}">
-                <a16:creationId xmlns="" xmlns:a16="http://schemas.microsoft.com/office/drawing/2014/main" id="{E84F61DF-65CA-45BF-9A0B-34B97F6A97EA}"/>
+                <a16:creationId xmlns:a16="http://schemas.microsoft.com/office/drawing/2014/main" xmlns="" id="{E84F61DF-65CA-45BF-9A0B-34B97F6A97EA}"/>
               </a:ext>
             </a:extLst>
           </p:cNvPr>
@@ -8326,7 +8326,7 @@
           <p:cNvPr id="8" name="Text Placeholder 7">
             <a:extLst>
               <a:ext uri="{FF2B5EF4-FFF2-40B4-BE49-F238E27FC236}">
-                <a16:creationId xmlns="" xmlns:a16="http://schemas.microsoft.com/office/drawing/2014/main" id="{27CE2609-37DA-4C4C-BF45-E56CE85AA41D}"/>
+                <a16:creationId xmlns:a16="http://schemas.microsoft.com/office/drawing/2014/main" xmlns="" id="{27CE2609-37DA-4C4C-BF45-E56CE85AA41D}"/>
               </a:ext>
             </a:extLst>
           </p:cNvPr>
@@ -8440,7 +8440,7 @@
           <p:cNvPr id="13" name="Text Placeholder 7">
             <a:extLst>
               <a:ext uri="{FF2B5EF4-FFF2-40B4-BE49-F238E27FC236}">
-                <a16:creationId xmlns="" xmlns:a16="http://schemas.microsoft.com/office/drawing/2014/main" id="{D8D7F005-BA7C-423E-87B0-6782D88233F6}"/>
+                <a16:creationId xmlns:a16="http://schemas.microsoft.com/office/drawing/2014/main" xmlns="" id="{D8D7F005-BA7C-423E-87B0-6782D88233F6}"/>
               </a:ext>
             </a:extLst>
           </p:cNvPr>
@@ -8514,7 +8514,7 @@
           <p:cNvPr id="14" name="Text Placeholder 7">
             <a:extLst>
               <a:ext uri="{FF2B5EF4-FFF2-40B4-BE49-F238E27FC236}">
-                <a16:creationId xmlns="" xmlns:a16="http://schemas.microsoft.com/office/drawing/2014/main" id="{47BDC0DA-1585-454D-9E74-41D2AFC0FEE5}"/>
+                <a16:creationId xmlns:a16="http://schemas.microsoft.com/office/drawing/2014/main" xmlns="" id="{47BDC0DA-1585-454D-9E74-41D2AFC0FEE5}"/>
               </a:ext>
             </a:extLst>
           </p:cNvPr>
@@ -8616,7 +8616,7 @@
           <p:cNvPr id="16" name="Text Placeholder 7">
             <a:extLst>
               <a:ext uri="{FF2B5EF4-FFF2-40B4-BE49-F238E27FC236}">
-                <a16:creationId xmlns="" xmlns:a16="http://schemas.microsoft.com/office/drawing/2014/main" id="{27CE2609-37DA-4C4C-BF45-E56CE85AA41D}"/>
+                <a16:creationId xmlns:a16="http://schemas.microsoft.com/office/drawing/2014/main" xmlns="" id="{27CE2609-37DA-4C4C-BF45-E56CE85AA41D}"/>
               </a:ext>
             </a:extLst>
           </p:cNvPr>
@@ -8783,7 +8783,7 @@
           <p:cNvPr id="3" name="Text Placeholder 7">
             <a:extLst>
               <a:ext uri="{FF2B5EF4-FFF2-40B4-BE49-F238E27FC236}">
-                <a16:creationId xmlns="" xmlns:a16="http://schemas.microsoft.com/office/drawing/2014/main" id="{27CE2609-37DA-4C4C-BF45-E56CE85AA41D}"/>
+                <a16:creationId xmlns:a16="http://schemas.microsoft.com/office/drawing/2014/main" xmlns="" id="{27CE2609-37DA-4C4C-BF45-E56CE85AA41D}"/>
               </a:ext>
             </a:extLst>
           </p:cNvPr>
@@ -8897,7 +8897,7 @@
           <p:cNvPr id="4" name="Text Placeholder 7">
             <a:extLst>
               <a:ext uri="{FF2B5EF4-FFF2-40B4-BE49-F238E27FC236}">
-                <a16:creationId xmlns="" xmlns:a16="http://schemas.microsoft.com/office/drawing/2014/main" id="{D8D7F005-BA7C-423E-87B0-6782D88233F6}"/>
+                <a16:creationId xmlns:a16="http://schemas.microsoft.com/office/drawing/2014/main" xmlns="" id="{D8D7F005-BA7C-423E-87B0-6782D88233F6}"/>
               </a:ext>
             </a:extLst>
           </p:cNvPr>
@@ -8983,7 +8983,7 @@
           <p:cNvPr id="9" name="Text Placeholder 7">
             <a:extLst>
               <a:ext uri="{FF2B5EF4-FFF2-40B4-BE49-F238E27FC236}">
-                <a16:creationId xmlns="" xmlns:a16="http://schemas.microsoft.com/office/drawing/2014/main" id="{27CE2609-37DA-4C4C-BF45-E56CE85AA41D}"/>
+                <a16:creationId xmlns:a16="http://schemas.microsoft.com/office/drawing/2014/main" xmlns="" id="{27CE2609-37DA-4C4C-BF45-E56CE85AA41D}"/>
               </a:ext>
             </a:extLst>
           </p:cNvPr>
@@ -9097,7 +9097,7 @@
           <p:cNvPr id="10" name="Text Placeholder 7">
             <a:extLst>
               <a:ext uri="{FF2B5EF4-FFF2-40B4-BE49-F238E27FC236}">
-                <a16:creationId xmlns="" xmlns:a16="http://schemas.microsoft.com/office/drawing/2014/main" id="{D8D7F005-BA7C-423E-87B0-6782D88233F6}"/>
+                <a16:creationId xmlns:a16="http://schemas.microsoft.com/office/drawing/2014/main" xmlns="" id="{D8D7F005-BA7C-423E-87B0-6782D88233F6}"/>
               </a:ext>
             </a:extLst>
           </p:cNvPr>
@@ -9183,7 +9183,7 @@
           <p:cNvPr id="11" name="Text Placeholder 7">
             <a:extLst>
               <a:ext uri="{FF2B5EF4-FFF2-40B4-BE49-F238E27FC236}">
-                <a16:creationId xmlns="" xmlns:a16="http://schemas.microsoft.com/office/drawing/2014/main" id="{27CE2609-37DA-4C4C-BF45-E56CE85AA41D}"/>
+                <a16:creationId xmlns:a16="http://schemas.microsoft.com/office/drawing/2014/main" xmlns="" id="{27CE2609-37DA-4C4C-BF45-E56CE85AA41D}"/>
               </a:ext>
             </a:extLst>
           </p:cNvPr>
@@ -9297,7 +9297,7 @@
           <p:cNvPr id="12" name="Text Placeholder 7">
             <a:extLst>
               <a:ext uri="{FF2B5EF4-FFF2-40B4-BE49-F238E27FC236}">
-                <a16:creationId xmlns="" xmlns:a16="http://schemas.microsoft.com/office/drawing/2014/main" id="{D8D7F005-BA7C-423E-87B0-6782D88233F6}"/>
+                <a16:creationId xmlns:a16="http://schemas.microsoft.com/office/drawing/2014/main" xmlns="" id="{D8D7F005-BA7C-423E-87B0-6782D88233F6}"/>
               </a:ext>
             </a:extLst>
           </p:cNvPr>
@@ -9428,7 +9428,7 @@
           <a:graphicData uri="http://schemas.openxmlformats.org/presentationml/2006/ole">
             <mc:AlternateContent xmlns:mc="http://schemas.openxmlformats.org/markup-compatibility/2006">
               <mc:Choice xmlns:v="urn:schemas-microsoft-com:vml" Requires="v">
-                <p:oleObj spid="_x0000_s8225" name="think-cell Slide" r:id="rId4" imgW="270" imgH="270" progId="TCLayout.ActiveDocument.1">
+                <p:oleObj spid="_x0000_s8226" name="think-cell Slide" r:id="rId4" imgW="270" imgH="270" progId="TCLayout.ActiveDocument.1">
                   <p:embed/>
                 </p:oleObj>
               </mc:Choice>
@@ -9896,7 +9896,7 @@
           <p:cNvPr id="12" name="Freeform: Shape 11">
             <a:extLst>
               <a:ext uri="{FF2B5EF4-FFF2-40B4-BE49-F238E27FC236}">
-                <a16:creationId xmlns="" xmlns:a16="http://schemas.microsoft.com/office/drawing/2014/main" id="{F5F5AEA1-6A77-4676-B8B3-EF658F5F8430}"/>
+                <a16:creationId xmlns:a16="http://schemas.microsoft.com/office/drawing/2014/main" xmlns="" id="{F5F5AEA1-6A77-4676-B8B3-EF658F5F8430}"/>
               </a:ext>
             </a:extLst>
           </p:cNvPr>
@@ -10089,7 +10089,7 @@
           <p:cNvPr id="26" name="Text Placeholder 4">
             <a:extLst>
               <a:ext uri="{FF2B5EF4-FFF2-40B4-BE49-F238E27FC236}">
-                <a16:creationId xmlns="" xmlns:a16="http://schemas.microsoft.com/office/drawing/2014/main" id="{7E551D69-F21D-4601-B4BD-97ECB52F39D6}"/>
+                <a16:creationId xmlns:a16="http://schemas.microsoft.com/office/drawing/2014/main" xmlns="" id="{7E551D69-F21D-4601-B4BD-97ECB52F39D6}"/>
               </a:ext>
             </a:extLst>
           </p:cNvPr>
@@ -10149,7 +10149,7 @@
           <p:cNvPr id="23" name="Text Placeholder 4">
             <a:extLst>
               <a:ext uri="{FF2B5EF4-FFF2-40B4-BE49-F238E27FC236}">
-                <a16:creationId xmlns="" xmlns:a16="http://schemas.microsoft.com/office/drawing/2014/main" id="{BC359575-5CC3-4B2F-91E7-19D6A150BE7B}"/>
+                <a16:creationId xmlns:a16="http://schemas.microsoft.com/office/drawing/2014/main" xmlns="" id="{BC359575-5CC3-4B2F-91E7-19D6A150BE7B}"/>
               </a:ext>
             </a:extLst>
           </p:cNvPr>
@@ -10209,7 +10209,7 @@
           <p:cNvPr id="24" name="Text Placeholder 7">
             <a:extLst>
               <a:ext uri="{FF2B5EF4-FFF2-40B4-BE49-F238E27FC236}">
-                <a16:creationId xmlns="" xmlns:a16="http://schemas.microsoft.com/office/drawing/2014/main" id="{53745724-67BB-4475-9660-FEEE12268615}"/>
+                <a16:creationId xmlns:a16="http://schemas.microsoft.com/office/drawing/2014/main" xmlns="" id="{53745724-67BB-4475-9660-FEEE12268615}"/>
               </a:ext>
             </a:extLst>
           </p:cNvPr>
@@ -10283,7 +10283,7 @@
           <p:cNvPr id="27" name="Text Placeholder 7">
             <a:extLst>
               <a:ext uri="{FF2B5EF4-FFF2-40B4-BE49-F238E27FC236}">
-                <a16:creationId xmlns="" xmlns:a16="http://schemas.microsoft.com/office/drawing/2014/main" id="{C78431F2-3F85-4748-A6BC-A08250A6D354}"/>
+                <a16:creationId xmlns:a16="http://schemas.microsoft.com/office/drawing/2014/main" xmlns="" id="{C78431F2-3F85-4748-A6BC-A08250A6D354}"/>
               </a:ext>
             </a:extLst>
           </p:cNvPr>
@@ -10357,7 +10357,7 @@
           <p:cNvPr id="13" name="Oval 20">
             <a:extLst>
               <a:ext uri="{FF2B5EF4-FFF2-40B4-BE49-F238E27FC236}">
-                <a16:creationId xmlns="" xmlns:a16="http://schemas.microsoft.com/office/drawing/2014/main" id="{1EFB3510-D39A-47CF-8191-109DDF9E53D5}"/>
+                <a16:creationId xmlns:a16="http://schemas.microsoft.com/office/drawing/2014/main" xmlns="" id="{1EFB3510-D39A-47CF-8191-109DDF9E53D5}"/>
               </a:ext>
             </a:extLst>
           </p:cNvPr>
@@ -10617,7 +10617,7 @@
           <a:graphicData uri="http://schemas.openxmlformats.org/presentationml/2006/ole">
             <mc:AlternateContent xmlns:mc="http://schemas.openxmlformats.org/markup-compatibility/2006">
               <mc:Choice xmlns:v="urn:schemas-microsoft-com:vml" Requires="v">
-                <p:oleObj spid="_x0000_s9249" name="think-cell Slide" r:id="rId4" imgW="270" imgH="270" progId="TCLayout.ActiveDocument.1">
+                <p:oleObj spid="_x0000_s9250" name="think-cell Slide" r:id="rId4" imgW="270" imgH="270" progId="TCLayout.ActiveDocument.1">
                   <p:embed/>
                 </p:oleObj>
               </mc:Choice>
@@ -10726,7 +10726,7 @@
           <p:cNvPr id="3" name="Freeform: Shape 9">
             <a:extLst>
               <a:ext uri="{FF2B5EF4-FFF2-40B4-BE49-F238E27FC236}">
-                <a16:creationId xmlns="" xmlns:a16="http://schemas.microsoft.com/office/drawing/2014/main" id="{531E77B6-0DD5-446F-A826-892DFC23D785}"/>
+                <a16:creationId xmlns:a16="http://schemas.microsoft.com/office/drawing/2014/main" xmlns="" id="{531E77B6-0DD5-446F-A826-892DFC23D785}"/>
               </a:ext>
             </a:extLst>
           </p:cNvPr>
@@ -10899,7 +10899,7 @@
           <p:cNvPr id="7" name="Retângulo 43">
             <a:extLst>
               <a:ext uri="{FF2B5EF4-FFF2-40B4-BE49-F238E27FC236}">
-                <a16:creationId xmlns="" xmlns:a16="http://schemas.microsoft.com/office/drawing/2014/main" id="{25FC8637-25BD-4C09-AF25-56B4243DAB3D}"/>
+                <a16:creationId xmlns:a16="http://schemas.microsoft.com/office/drawing/2014/main" xmlns="" id="{25FC8637-25BD-4C09-AF25-56B4243DAB3D}"/>
               </a:ext>
             </a:extLst>
           </p:cNvPr>
@@ -10950,7 +10950,7 @@
           <p:cNvPr id="8" name="Text Placeholder 7">
             <a:extLst>
               <a:ext uri="{FF2B5EF4-FFF2-40B4-BE49-F238E27FC236}">
-                <a16:creationId xmlns="" xmlns:a16="http://schemas.microsoft.com/office/drawing/2014/main" id="{E824319D-02CC-441E-87B5-E9D15DE8CA35}"/>
+                <a16:creationId xmlns:a16="http://schemas.microsoft.com/office/drawing/2014/main" xmlns="" id="{E824319D-02CC-441E-87B5-E9D15DE8CA35}"/>
               </a:ext>
             </a:extLst>
           </p:cNvPr>
@@ -11562,7 +11562,7 @@
           <a:graphicData uri="http://schemas.openxmlformats.org/presentationml/2006/ole">
             <mc:AlternateContent xmlns:mc="http://schemas.openxmlformats.org/markup-compatibility/2006">
               <mc:Choice xmlns:v="urn:schemas-microsoft-com:vml" Requires="v">
-                <p:oleObj spid="_x0000_s10273" name="think-cell Slide" r:id="rId4" imgW="270" imgH="270" progId="TCLayout.ActiveDocument.1">
+                <p:oleObj spid="_x0000_s10274" name="think-cell Slide" r:id="rId4" imgW="270" imgH="270" progId="TCLayout.ActiveDocument.1">
                   <p:embed/>
                 </p:oleObj>
               </mc:Choice>
@@ -11621,7 +11621,7 @@
           <p:cNvPr id="13" name="Rectangle 12">
             <a:extLst>
               <a:ext uri="{FF2B5EF4-FFF2-40B4-BE49-F238E27FC236}">
-                <a16:creationId xmlns="" xmlns:a16="http://schemas.microsoft.com/office/drawing/2014/main" id="{9455EBB8-DB3C-45D2-B02F-0B36A58E555B}"/>
+                <a16:creationId xmlns:a16="http://schemas.microsoft.com/office/drawing/2014/main" xmlns="" id="{9455EBB8-DB3C-45D2-B02F-0B36A58E555B}"/>
               </a:ext>
             </a:extLst>
           </p:cNvPr>
@@ -11911,7 +11911,7 @@
           <p:cNvPr id="14" name="Text Placeholder 7">
             <a:extLst>
               <a:ext uri="{FF2B5EF4-FFF2-40B4-BE49-F238E27FC236}">
-                <a16:creationId xmlns="" xmlns:a16="http://schemas.microsoft.com/office/drawing/2014/main" id="{9949BCD6-E419-4ED2-9061-402DD5FF2406}"/>
+                <a16:creationId xmlns:a16="http://schemas.microsoft.com/office/drawing/2014/main" xmlns="" id="{9949BCD6-E419-4ED2-9061-402DD5FF2406}"/>
               </a:ext>
             </a:extLst>
           </p:cNvPr>
@@ -12002,7 +12002,7 @@
           <p:cNvPr id="15" name="Text Placeholder 4">
             <a:extLst>
               <a:ext uri="{FF2B5EF4-FFF2-40B4-BE49-F238E27FC236}">
-                <a16:creationId xmlns="" xmlns:a16="http://schemas.microsoft.com/office/drawing/2014/main" id="{3F6EE60C-2261-45A0-AD6F-B5F767C57B57}"/>
+                <a16:creationId xmlns:a16="http://schemas.microsoft.com/office/drawing/2014/main" xmlns="" id="{3F6EE60C-2261-45A0-AD6F-B5F767C57B57}"/>
               </a:ext>
             </a:extLst>
           </p:cNvPr>
@@ -12062,7 +12062,7 @@
           <p:cNvPr id="16" name="Text Placeholder 7">
             <a:extLst>
               <a:ext uri="{FF2B5EF4-FFF2-40B4-BE49-F238E27FC236}">
-                <a16:creationId xmlns="" xmlns:a16="http://schemas.microsoft.com/office/drawing/2014/main" id="{ABE7F41D-73F9-4353-AE3F-71AB8377048D}"/>
+                <a16:creationId xmlns:a16="http://schemas.microsoft.com/office/drawing/2014/main" xmlns="" id="{ABE7F41D-73F9-4353-AE3F-71AB8377048D}"/>
               </a:ext>
             </a:extLst>
           </p:cNvPr>
@@ -12153,7 +12153,7 @@
           <p:cNvPr id="17" name="Text Placeholder 4">
             <a:extLst>
               <a:ext uri="{FF2B5EF4-FFF2-40B4-BE49-F238E27FC236}">
-                <a16:creationId xmlns="" xmlns:a16="http://schemas.microsoft.com/office/drawing/2014/main" id="{83D9B326-443F-495A-B788-21C48AC85AE2}"/>
+                <a16:creationId xmlns:a16="http://schemas.microsoft.com/office/drawing/2014/main" xmlns="" id="{83D9B326-443F-495A-B788-21C48AC85AE2}"/>
               </a:ext>
             </a:extLst>
           </p:cNvPr>
@@ -12213,7 +12213,7 @@
           <p:cNvPr id="18" name="Text Placeholder 7">
             <a:extLst>
               <a:ext uri="{FF2B5EF4-FFF2-40B4-BE49-F238E27FC236}">
-                <a16:creationId xmlns="" xmlns:a16="http://schemas.microsoft.com/office/drawing/2014/main" id="{00358894-025F-4D0E-AF6E-F99EDF29800A}"/>
+                <a16:creationId xmlns:a16="http://schemas.microsoft.com/office/drawing/2014/main" xmlns="" id="{00358894-025F-4D0E-AF6E-F99EDF29800A}"/>
               </a:ext>
             </a:extLst>
           </p:cNvPr>
@@ -12304,7 +12304,7 @@
           <p:cNvPr id="19" name="Text Placeholder 4">
             <a:extLst>
               <a:ext uri="{FF2B5EF4-FFF2-40B4-BE49-F238E27FC236}">
-                <a16:creationId xmlns="" xmlns:a16="http://schemas.microsoft.com/office/drawing/2014/main" id="{EE5AF299-5A92-48E3-B18F-F7FE7AB9EED4}"/>
+                <a16:creationId xmlns:a16="http://schemas.microsoft.com/office/drawing/2014/main" xmlns="" id="{EE5AF299-5A92-48E3-B18F-F7FE7AB9EED4}"/>
               </a:ext>
             </a:extLst>
           </p:cNvPr>
@@ -12364,7 +12364,7 @@
           <p:cNvPr id="20" name="Text Placeholder 7">
             <a:extLst>
               <a:ext uri="{FF2B5EF4-FFF2-40B4-BE49-F238E27FC236}">
-                <a16:creationId xmlns="" xmlns:a16="http://schemas.microsoft.com/office/drawing/2014/main" id="{F951F368-6540-4675-9A52-0824638E0EF4}"/>
+                <a16:creationId xmlns:a16="http://schemas.microsoft.com/office/drawing/2014/main" xmlns="" id="{F951F368-6540-4675-9A52-0824638E0EF4}"/>
               </a:ext>
             </a:extLst>
           </p:cNvPr>
@@ -12455,7 +12455,7 @@
           <p:cNvPr id="21" name="Text Placeholder 4">
             <a:extLst>
               <a:ext uri="{FF2B5EF4-FFF2-40B4-BE49-F238E27FC236}">
-                <a16:creationId xmlns="" xmlns:a16="http://schemas.microsoft.com/office/drawing/2014/main" id="{B7C16A20-D927-494E-94A9-49AF2E1FA010}"/>
+                <a16:creationId xmlns:a16="http://schemas.microsoft.com/office/drawing/2014/main" xmlns="" id="{B7C16A20-D927-494E-94A9-49AF2E1FA010}"/>
               </a:ext>
             </a:extLst>
           </p:cNvPr>
@@ -12515,7 +12515,7 @@
           <p:cNvPr id="22" name="Text Placeholder 4">
             <a:extLst>
               <a:ext uri="{FF2B5EF4-FFF2-40B4-BE49-F238E27FC236}">
-                <a16:creationId xmlns="" xmlns:a16="http://schemas.microsoft.com/office/drawing/2014/main" id="{936BACCD-6FBF-486E-81CB-3462560DA2CE}"/>
+                <a16:creationId xmlns:a16="http://schemas.microsoft.com/office/drawing/2014/main" xmlns="" id="{936BACCD-6FBF-486E-81CB-3462560DA2CE}"/>
               </a:ext>
             </a:extLst>
           </p:cNvPr>
@@ -12575,7 +12575,7 @@
           <p:cNvPr id="23" name="Text Placeholder 4">
             <a:extLst>
               <a:ext uri="{FF2B5EF4-FFF2-40B4-BE49-F238E27FC236}">
-                <a16:creationId xmlns="" xmlns:a16="http://schemas.microsoft.com/office/drawing/2014/main" id="{48E9C506-31EA-4D04-B660-3B4DB0704112}"/>
+                <a16:creationId xmlns:a16="http://schemas.microsoft.com/office/drawing/2014/main" xmlns="" id="{48E9C506-31EA-4D04-B660-3B4DB0704112}"/>
               </a:ext>
             </a:extLst>
           </p:cNvPr>
@@ -12680,7 +12680,7 @@
           <a:graphicData uri="http://schemas.openxmlformats.org/presentationml/2006/ole">
             <mc:AlternateContent xmlns:mc="http://schemas.openxmlformats.org/markup-compatibility/2006">
               <mc:Choice xmlns:v="urn:schemas-microsoft-com:vml" Requires="v">
-                <p:oleObj spid="_x0000_s11297" name="think-cell Slide" r:id="rId4" imgW="270" imgH="270" progId="TCLayout.ActiveDocument.1">
+                <p:oleObj spid="_x0000_s11298" name="think-cell Slide" r:id="rId4" imgW="270" imgH="270" progId="TCLayout.ActiveDocument.1">
                   <p:embed/>
                 </p:oleObj>
               </mc:Choice>
@@ -12815,7 +12815,7 @@
           <a:graphicData uri="http://schemas.openxmlformats.org/presentationml/2006/ole">
             <mc:AlternateContent xmlns:mc="http://schemas.openxmlformats.org/markup-compatibility/2006">
               <mc:Choice xmlns:v="urn:schemas-microsoft-com:vml" Requires="v">
-                <p:oleObj spid="_x0000_s7201" name="think-cell Slide" r:id="rId15" imgW="270" imgH="270" progId="TCLayout.ActiveDocument.1">
+                <p:oleObj spid="_x0000_s7202" name="think-cell Slide" r:id="rId15" imgW="270" imgH="270" progId="TCLayout.ActiveDocument.1">
                   <p:embed/>
                 </p:oleObj>
               </mc:Choice>
@@ -13157,7 +13157,7 @@
           <p:cNvPr id="7" name="Retângulo 43">
             <a:extLst>
               <a:ext uri="{FF2B5EF4-FFF2-40B4-BE49-F238E27FC236}">
-                <a16:creationId xmlns="" xmlns:a16="http://schemas.microsoft.com/office/drawing/2014/main" id="{25FC8637-25BD-4C09-AF25-56B4243DAB3D}"/>
+                <a16:creationId xmlns:a16="http://schemas.microsoft.com/office/drawing/2014/main" xmlns="" id="{25FC8637-25BD-4C09-AF25-56B4243DAB3D}"/>
               </a:ext>
             </a:extLst>
           </p:cNvPr>
@@ -13208,7 +13208,7 @@
           <p:cNvPr id="6" name="Text Placeholder 7">
             <a:extLst>
               <a:ext uri="{FF2B5EF4-FFF2-40B4-BE49-F238E27FC236}">
-                <a16:creationId xmlns="" xmlns:a16="http://schemas.microsoft.com/office/drawing/2014/main" id="{E824319D-02CC-441E-87B5-E9D15DE8CA35}"/>
+                <a16:creationId xmlns:a16="http://schemas.microsoft.com/office/drawing/2014/main" xmlns="" id="{E824319D-02CC-441E-87B5-E9D15DE8CA35}"/>
               </a:ext>
             </a:extLst>
           </p:cNvPr>
@@ -13427,7 +13427,7 @@
           <p:cNvPr id="8" name="Text Placeholder 7">
             <a:extLst>
               <a:ext uri="{FF2B5EF4-FFF2-40B4-BE49-F238E27FC236}">
-                <a16:creationId xmlns="" xmlns:a16="http://schemas.microsoft.com/office/drawing/2014/main" id="{E824319D-02CC-441E-87B5-E9D15DE8CA35}"/>
+                <a16:creationId xmlns:a16="http://schemas.microsoft.com/office/drawing/2014/main" xmlns="" id="{E824319D-02CC-441E-87B5-E9D15DE8CA35}"/>
               </a:ext>
             </a:extLst>
           </p:cNvPr>
@@ -13748,7 +13748,7 @@
           <p:cNvPr id="3" name="Groupe 2">
             <a:extLst>
               <a:ext uri="{FF2B5EF4-FFF2-40B4-BE49-F238E27FC236}">
-                <a16:creationId xmlns="" xmlns:a16="http://schemas.microsoft.com/office/drawing/2014/main" id="{231F4250-75BE-456B-A9D8-680BA4145249}"/>
+                <a16:creationId xmlns:a16="http://schemas.microsoft.com/office/drawing/2014/main" xmlns="" id="{231F4250-75BE-456B-A9D8-680BA4145249}"/>
               </a:ext>
             </a:extLst>
           </p:cNvPr>
@@ -13768,7 +13768,7 @@
             <p:cNvPr id="11" name="Rectangle 10">
               <a:extLst>
                 <a:ext uri="{FF2B5EF4-FFF2-40B4-BE49-F238E27FC236}">
-                  <a16:creationId xmlns="" xmlns:a16="http://schemas.microsoft.com/office/drawing/2014/main" id="{EF1244FD-1856-4971-9A73-AD6DF3F42A90}"/>
+                  <a16:creationId xmlns:a16="http://schemas.microsoft.com/office/drawing/2014/main" xmlns="" id="{EF1244FD-1856-4971-9A73-AD6DF3F42A90}"/>
                 </a:ext>
               </a:extLst>
             </p:cNvPr>
@@ -13828,7 +13828,7 @@
             <p:cNvPr id="12" name="Rectangle 11">
               <a:extLst>
                 <a:ext uri="{FF2B5EF4-FFF2-40B4-BE49-F238E27FC236}">
-                  <a16:creationId xmlns="" xmlns:a16="http://schemas.microsoft.com/office/drawing/2014/main" id="{22B40C78-6F20-4C95-AB26-B29FEC0FF747}"/>
+                  <a16:creationId xmlns:a16="http://schemas.microsoft.com/office/drawing/2014/main" xmlns="" id="{22B40C78-6F20-4C95-AB26-B29FEC0FF747}"/>
                 </a:ext>
               </a:extLst>
             </p:cNvPr>
@@ -13888,7 +13888,7 @@
             <p:cNvPr id="13" name="Rectangle 12">
               <a:extLst>
                 <a:ext uri="{FF2B5EF4-FFF2-40B4-BE49-F238E27FC236}">
-                  <a16:creationId xmlns="" xmlns:a16="http://schemas.microsoft.com/office/drawing/2014/main" id="{1AED4E7D-39CE-49AE-9D4C-16EA940CBE5F}"/>
+                  <a16:creationId xmlns:a16="http://schemas.microsoft.com/office/drawing/2014/main" xmlns="" id="{1AED4E7D-39CE-49AE-9D4C-16EA940CBE5F}"/>
                 </a:ext>
               </a:extLst>
             </p:cNvPr>
@@ -13949,7 +13949,7 @@
           <p:cNvPr id="5" name="Groupe 4">
             <a:extLst>
               <a:ext uri="{FF2B5EF4-FFF2-40B4-BE49-F238E27FC236}">
-                <a16:creationId xmlns="" xmlns:a16="http://schemas.microsoft.com/office/drawing/2014/main" id="{CC6ACEFF-8651-4C08-BAF6-3BFAE6473DAF}"/>
+                <a16:creationId xmlns:a16="http://schemas.microsoft.com/office/drawing/2014/main" xmlns="" id="{CC6ACEFF-8651-4C08-BAF6-3BFAE6473DAF}"/>
               </a:ext>
             </a:extLst>
           </p:cNvPr>
@@ -13969,7 +13969,7 @@
             <p:cNvPr id="16" name="Rectangle 15">
               <a:extLst>
                 <a:ext uri="{FF2B5EF4-FFF2-40B4-BE49-F238E27FC236}">
-                  <a16:creationId xmlns="" xmlns:a16="http://schemas.microsoft.com/office/drawing/2014/main" id="{D27E2B2B-AB85-4173-AB1F-61084925AA83}"/>
+                  <a16:creationId xmlns:a16="http://schemas.microsoft.com/office/drawing/2014/main" xmlns="" id="{D27E2B2B-AB85-4173-AB1F-61084925AA83}"/>
                 </a:ext>
               </a:extLst>
             </p:cNvPr>
@@ -14029,7 +14029,7 @@
             <p:cNvPr id="17" name="Rectangle 16">
               <a:extLst>
                 <a:ext uri="{FF2B5EF4-FFF2-40B4-BE49-F238E27FC236}">
-                  <a16:creationId xmlns="" xmlns:a16="http://schemas.microsoft.com/office/drawing/2014/main" id="{0DDEBD8A-CA0B-4D62-9426-DFB2D4742184}"/>
+                  <a16:creationId xmlns:a16="http://schemas.microsoft.com/office/drawing/2014/main" xmlns="" id="{0DDEBD8A-CA0B-4D62-9426-DFB2D4742184}"/>
                 </a:ext>
               </a:extLst>
             </p:cNvPr>
@@ -14089,7 +14089,7 @@
             <p:cNvPr id="18" name="Rectangle 17">
               <a:extLst>
                 <a:ext uri="{FF2B5EF4-FFF2-40B4-BE49-F238E27FC236}">
-                  <a16:creationId xmlns="" xmlns:a16="http://schemas.microsoft.com/office/drawing/2014/main" id="{65515214-3AFD-4A2B-95C5-2FDFF59A1BE2}"/>
+                  <a16:creationId xmlns:a16="http://schemas.microsoft.com/office/drawing/2014/main" xmlns="" id="{65515214-3AFD-4A2B-95C5-2FDFF59A1BE2}"/>
                 </a:ext>
               </a:extLst>
             </p:cNvPr>
@@ -14149,7 +14149,7 @@
             <p:cNvPr id="19" name="Rectangle 18">
               <a:extLst>
                 <a:ext uri="{FF2B5EF4-FFF2-40B4-BE49-F238E27FC236}">
-                  <a16:creationId xmlns="" xmlns:a16="http://schemas.microsoft.com/office/drawing/2014/main" id="{D674829A-E5EF-4140-B9ED-AC7745AB028D}"/>
+                  <a16:creationId xmlns:a16="http://schemas.microsoft.com/office/drawing/2014/main" xmlns="" id="{D674829A-E5EF-4140-B9ED-AC7745AB028D}"/>
                 </a:ext>
               </a:extLst>
             </p:cNvPr>
@@ -14209,7 +14209,7 @@
             <p:cNvPr id="20" name="Rectangle 19">
               <a:extLst>
                 <a:ext uri="{FF2B5EF4-FFF2-40B4-BE49-F238E27FC236}">
-                  <a16:creationId xmlns="" xmlns:a16="http://schemas.microsoft.com/office/drawing/2014/main" id="{E59B3FCE-0262-45FE-BE39-9459C5BC7FEE}"/>
+                  <a16:creationId xmlns:a16="http://schemas.microsoft.com/office/drawing/2014/main" xmlns="" id="{E59B3FCE-0262-45FE-BE39-9459C5BC7FEE}"/>
                 </a:ext>
               </a:extLst>
             </p:cNvPr>
@@ -14269,7 +14269,7 @@
             <p:cNvPr id="22" name="Rectangle 21">
               <a:extLst>
                 <a:ext uri="{FF2B5EF4-FFF2-40B4-BE49-F238E27FC236}">
-                  <a16:creationId xmlns="" xmlns:a16="http://schemas.microsoft.com/office/drawing/2014/main" id="{F5D692DE-D6DE-4022-9F2F-5F8C1403E4D0}"/>
+                  <a16:creationId xmlns:a16="http://schemas.microsoft.com/office/drawing/2014/main" xmlns="" id="{F5D692DE-D6DE-4022-9F2F-5F8C1403E4D0}"/>
                 </a:ext>
               </a:extLst>
             </p:cNvPr>
@@ -14329,7 +14329,7 @@
             <p:cNvPr id="23" name="Rectangle 22">
               <a:extLst>
                 <a:ext uri="{FF2B5EF4-FFF2-40B4-BE49-F238E27FC236}">
-                  <a16:creationId xmlns="" xmlns:a16="http://schemas.microsoft.com/office/drawing/2014/main" id="{35EEF2F0-E01D-4851-96E7-30214EC78A3B}"/>
+                  <a16:creationId xmlns:a16="http://schemas.microsoft.com/office/drawing/2014/main" xmlns="" id="{35EEF2F0-E01D-4851-96E7-30214EC78A3B}"/>
                 </a:ext>
               </a:extLst>
             </p:cNvPr>
@@ -14389,7 +14389,7 @@
             <p:cNvPr id="24" name="Rectangle 23">
               <a:extLst>
                 <a:ext uri="{FF2B5EF4-FFF2-40B4-BE49-F238E27FC236}">
-                  <a16:creationId xmlns="" xmlns:a16="http://schemas.microsoft.com/office/drawing/2014/main" id="{468B1DDD-74B0-4453-A996-5BA8693FF545}"/>
+                  <a16:creationId xmlns:a16="http://schemas.microsoft.com/office/drawing/2014/main" xmlns="" id="{468B1DDD-74B0-4453-A996-5BA8693FF545}"/>
                 </a:ext>
               </a:extLst>
             </p:cNvPr>
@@ -14449,7 +14449,7 @@
             <p:cNvPr id="25" name="Rectangle 24">
               <a:extLst>
                 <a:ext uri="{FF2B5EF4-FFF2-40B4-BE49-F238E27FC236}">
-                  <a16:creationId xmlns="" xmlns:a16="http://schemas.microsoft.com/office/drawing/2014/main" id="{8809D5E9-1B2A-4D30-A4DD-47B7C9BBCEDC}"/>
+                  <a16:creationId xmlns:a16="http://schemas.microsoft.com/office/drawing/2014/main" xmlns="" id="{8809D5E9-1B2A-4D30-A4DD-47B7C9BBCEDC}"/>
                 </a:ext>
               </a:extLst>
             </p:cNvPr>
@@ -14509,7 +14509,7 @@
             <p:cNvPr id="26" name="Rectangle 25">
               <a:extLst>
                 <a:ext uri="{FF2B5EF4-FFF2-40B4-BE49-F238E27FC236}">
-                  <a16:creationId xmlns="" xmlns:a16="http://schemas.microsoft.com/office/drawing/2014/main" id="{995FF3A0-94CA-40BA-AF81-B777FF5FD489}"/>
+                  <a16:creationId xmlns:a16="http://schemas.microsoft.com/office/drawing/2014/main" xmlns="" id="{995FF3A0-94CA-40BA-AF81-B777FF5FD489}"/>
                 </a:ext>
               </a:extLst>
             </p:cNvPr>
@@ -14569,7 +14569,7 @@
             <p:cNvPr id="27" name="Rectangle 26">
               <a:extLst>
                 <a:ext uri="{FF2B5EF4-FFF2-40B4-BE49-F238E27FC236}">
-                  <a16:creationId xmlns="" xmlns:a16="http://schemas.microsoft.com/office/drawing/2014/main" id="{9F83F12C-5135-43B7-B1D8-A0A72DB85AED}"/>
+                  <a16:creationId xmlns:a16="http://schemas.microsoft.com/office/drawing/2014/main" xmlns="" id="{9F83F12C-5135-43B7-B1D8-A0A72DB85AED}"/>
                 </a:ext>
               </a:extLst>
             </p:cNvPr>
@@ -14629,7 +14629,7 @@
             <p:cNvPr id="28" name="Rectangle 27">
               <a:extLst>
                 <a:ext uri="{FF2B5EF4-FFF2-40B4-BE49-F238E27FC236}">
-                  <a16:creationId xmlns="" xmlns:a16="http://schemas.microsoft.com/office/drawing/2014/main" id="{256CA1CF-2C4A-42DA-94F5-CB5E5B47F24B}"/>
+                  <a16:creationId xmlns:a16="http://schemas.microsoft.com/office/drawing/2014/main" xmlns="" id="{256CA1CF-2C4A-42DA-94F5-CB5E5B47F24B}"/>
                 </a:ext>
               </a:extLst>
             </p:cNvPr>
@@ -14689,7 +14689,7 @@
             <p:cNvPr id="29" name="Rectangle 28">
               <a:extLst>
                 <a:ext uri="{FF2B5EF4-FFF2-40B4-BE49-F238E27FC236}">
-                  <a16:creationId xmlns="" xmlns:a16="http://schemas.microsoft.com/office/drawing/2014/main" id="{47F07AFA-8569-4B3B-854A-60B26629D96D}"/>
+                  <a16:creationId xmlns:a16="http://schemas.microsoft.com/office/drawing/2014/main" xmlns="" id="{47F07AFA-8569-4B3B-854A-60B26629D96D}"/>
                 </a:ext>
               </a:extLst>
             </p:cNvPr>
@@ -14749,7 +14749,7 @@
             <p:cNvPr id="30" name="Rectangle 29">
               <a:extLst>
                 <a:ext uri="{FF2B5EF4-FFF2-40B4-BE49-F238E27FC236}">
-                  <a16:creationId xmlns="" xmlns:a16="http://schemas.microsoft.com/office/drawing/2014/main" id="{8103554C-8B73-4C9A-AFFF-55D6E47A0E76}"/>
+                  <a16:creationId xmlns:a16="http://schemas.microsoft.com/office/drawing/2014/main" xmlns="" id="{8103554C-8B73-4C9A-AFFF-55D6E47A0E76}"/>
                 </a:ext>
               </a:extLst>
             </p:cNvPr>
@@ -15133,7 +15133,7 @@
   </p:txStyles>
   <p:extLst mod="1">
     <p:ext uri="{27BBF7A9-308A-43DC-89C8-2F10F3537804}">
-      <p15:sldGuideLst xmlns="" xmlns:p15="http://schemas.microsoft.com/office/powerpoint/2012/main">
+      <p15:sldGuideLst xmlns:p15="http://schemas.microsoft.com/office/powerpoint/2012/main" xmlns="">
         <p15:guide id="1" orient="horz" pos="709">
           <p15:clr>
             <a:srgbClr val="F26B43"/>
@@ -15210,7 +15210,7 @@
           <a:graphicData uri="http://schemas.openxmlformats.org/presentationml/2006/ole">
             <mc:AlternateContent xmlns:mc="http://schemas.openxmlformats.org/markup-compatibility/2006">
               <mc:Choice xmlns:v="urn:schemas-microsoft-com:vml" Requires="v">
-                <p:oleObj spid="_x0000_s13341" name="think-cell Slide" r:id="rId16" imgW="270" imgH="270" progId="TCLayout.ActiveDocument.1">
+                <p:oleObj spid="_x0000_s13342" name="think-cell Slide" r:id="rId16" imgW="270" imgH="270" progId="TCLayout.ActiveDocument.1">
                   <p:embed/>
                 </p:oleObj>
               </mc:Choice>
@@ -15552,7 +15552,7 @@
           <p:cNvPr id="7" name="Retângulo 43">
             <a:extLst>
               <a:ext uri="{FF2B5EF4-FFF2-40B4-BE49-F238E27FC236}">
-                <a16:creationId xmlns="" xmlns:a16="http://schemas.microsoft.com/office/drawing/2014/main" id="{25FC8637-25BD-4C09-AF25-56B4243DAB3D}"/>
+                <a16:creationId xmlns:a16="http://schemas.microsoft.com/office/drawing/2014/main" xmlns="" id="{25FC8637-25BD-4C09-AF25-56B4243DAB3D}"/>
               </a:ext>
             </a:extLst>
           </p:cNvPr>
@@ -15603,7 +15603,7 @@
           <p:cNvPr id="6" name="Text Placeholder 7">
             <a:extLst>
               <a:ext uri="{FF2B5EF4-FFF2-40B4-BE49-F238E27FC236}">
-                <a16:creationId xmlns="" xmlns:a16="http://schemas.microsoft.com/office/drawing/2014/main" id="{E824319D-02CC-441E-87B5-E9D15DE8CA35}"/>
+                <a16:creationId xmlns:a16="http://schemas.microsoft.com/office/drawing/2014/main" xmlns="" id="{E824319D-02CC-441E-87B5-E9D15DE8CA35}"/>
               </a:ext>
             </a:extLst>
           </p:cNvPr>
@@ -15822,7 +15822,7 @@
           <p:cNvPr id="8" name="Text Placeholder 7">
             <a:extLst>
               <a:ext uri="{FF2B5EF4-FFF2-40B4-BE49-F238E27FC236}">
-                <a16:creationId xmlns="" xmlns:a16="http://schemas.microsoft.com/office/drawing/2014/main" id="{E824319D-02CC-441E-87B5-E9D15DE8CA35}"/>
+                <a16:creationId xmlns:a16="http://schemas.microsoft.com/office/drawing/2014/main" xmlns="" id="{E824319D-02CC-441E-87B5-E9D15DE8CA35}"/>
               </a:ext>
             </a:extLst>
           </p:cNvPr>
@@ -16143,7 +16143,7 @@
           <p:cNvPr id="3" name="Groupe 2">
             <a:extLst>
               <a:ext uri="{FF2B5EF4-FFF2-40B4-BE49-F238E27FC236}">
-                <a16:creationId xmlns="" xmlns:a16="http://schemas.microsoft.com/office/drawing/2014/main" id="{231F4250-75BE-456B-A9D8-680BA4145249}"/>
+                <a16:creationId xmlns:a16="http://schemas.microsoft.com/office/drawing/2014/main" xmlns="" id="{231F4250-75BE-456B-A9D8-680BA4145249}"/>
               </a:ext>
             </a:extLst>
           </p:cNvPr>
@@ -16163,7 +16163,7 @@
             <p:cNvPr id="11" name="Rectangle 10">
               <a:extLst>
                 <a:ext uri="{FF2B5EF4-FFF2-40B4-BE49-F238E27FC236}">
-                  <a16:creationId xmlns="" xmlns:a16="http://schemas.microsoft.com/office/drawing/2014/main" id="{EF1244FD-1856-4971-9A73-AD6DF3F42A90}"/>
+                  <a16:creationId xmlns:a16="http://schemas.microsoft.com/office/drawing/2014/main" xmlns="" id="{EF1244FD-1856-4971-9A73-AD6DF3F42A90}"/>
                 </a:ext>
               </a:extLst>
             </p:cNvPr>
@@ -16223,7 +16223,7 @@
             <p:cNvPr id="12" name="Rectangle 11">
               <a:extLst>
                 <a:ext uri="{FF2B5EF4-FFF2-40B4-BE49-F238E27FC236}">
-                  <a16:creationId xmlns="" xmlns:a16="http://schemas.microsoft.com/office/drawing/2014/main" id="{22B40C78-6F20-4C95-AB26-B29FEC0FF747}"/>
+                  <a16:creationId xmlns:a16="http://schemas.microsoft.com/office/drawing/2014/main" xmlns="" id="{22B40C78-6F20-4C95-AB26-B29FEC0FF747}"/>
                 </a:ext>
               </a:extLst>
             </p:cNvPr>
@@ -16283,7 +16283,7 @@
             <p:cNvPr id="13" name="Rectangle 12">
               <a:extLst>
                 <a:ext uri="{FF2B5EF4-FFF2-40B4-BE49-F238E27FC236}">
-                  <a16:creationId xmlns="" xmlns:a16="http://schemas.microsoft.com/office/drawing/2014/main" id="{1AED4E7D-39CE-49AE-9D4C-16EA940CBE5F}"/>
+                  <a16:creationId xmlns:a16="http://schemas.microsoft.com/office/drawing/2014/main" xmlns="" id="{1AED4E7D-39CE-49AE-9D4C-16EA940CBE5F}"/>
                 </a:ext>
               </a:extLst>
             </p:cNvPr>
@@ -16344,7 +16344,7 @@
           <p:cNvPr id="5" name="Groupe 4">
             <a:extLst>
               <a:ext uri="{FF2B5EF4-FFF2-40B4-BE49-F238E27FC236}">
-                <a16:creationId xmlns="" xmlns:a16="http://schemas.microsoft.com/office/drawing/2014/main" id="{CC6ACEFF-8651-4C08-BAF6-3BFAE6473DAF}"/>
+                <a16:creationId xmlns:a16="http://schemas.microsoft.com/office/drawing/2014/main" xmlns="" id="{CC6ACEFF-8651-4C08-BAF6-3BFAE6473DAF}"/>
               </a:ext>
             </a:extLst>
           </p:cNvPr>
@@ -16364,7 +16364,7 @@
             <p:cNvPr id="16" name="Rectangle 15">
               <a:extLst>
                 <a:ext uri="{FF2B5EF4-FFF2-40B4-BE49-F238E27FC236}">
-                  <a16:creationId xmlns="" xmlns:a16="http://schemas.microsoft.com/office/drawing/2014/main" id="{D27E2B2B-AB85-4173-AB1F-61084925AA83}"/>
+                  <a16:creationId xmlns:a16="http://schemas.microsoft.com/office/drawing/2014/main" xmlns="" id="{D27E2B2B-AB85-4173-AB1F-61084925AA83}"/>
                 </a:ext>
               </a:extLst>
             </p:cNvPr>
@@ -16424,7 +16424,7 @@
             <p:cNvPr id="17" name="Rectangle 16">
               <a:extLst>
                 <a:ext uri="{FF2B5EF4-FFF2-40B4-BE49-F238E27FC236}">
-                  <a16:creationId xmlns="" xmlns:a16="http://schemas.microsoft.com/office/drawing/2014/main" id="{0DDEBD8A-CA0B-4D62-9426-DFB2D4742184}"/>
+                  <a16:creationId xmlns:a16="http://schemas.microsoft.com/office/drawing/2014/main" xmlns="" id="{0DDEBD8A-CA0B-4D62-9426-DFB2D4742184}"/>
                 </a:ext>
               </a:extLst>
             </p:cNvPr>
@@ -16484,7 +16484,7 @@
             <p:cNvPr id="18" name="Rectangle 17">
               <a:extLst>
                 <a:ext uri="{FF2B5EF4-FFF2-40B4-BE49-F238E27FC236}">
-                  <a16:creationId xmlns="" xmlns:a16="http://schemas.microsoft.com/office/drawing/2014/main" id="{65515214-3AFD-4A2B-95C5-2FDFF59A1BE2}"/>
+                  <a16:creationId xmlns:a16="http://schemas.microsoft.com/office/drawing/2014/main" xmlns="" id="{65515214-3AFD-4A2B-95C5-2FDFF59A1BE2}"/>
                 </a:ext>
               </a:extLst>
             </p:cNvPr>
@@ -16544,7 +16544,7 @@
             <p:cNvPr id="19" name="Rectangle 18">
               <a:extLst>
                 <a:ext uri="{FF2B5EF4-FFF2-40B4-BE49-F238E27FC236}">
-                  <a16:creationId xmlns="" xmlns:a16="http://schemas.microsoft.com/office/drawing/2014/main" id="{D674829A-E5EF-4140-B9ED-AC7745AB028D}"/>
+                  <a16:creationId xmlns:a16="http://schemas.microsoft.com/office/drawing/2014/main" xmlns="" id="{D674829A-E5EF-4140-B9ED-AC7745AB028D}"/>
                 </a:ext>
               </a:extLst>
             </p:cNvPr>
@@ -16604,7 +16604,7 @@
             <p:cNvPr id="20" name="Rectangle 19">
               <a:extLst>
                 <a:ext uri="{FF2B5EF4-FFF2-40B4-BE49-F238E27FC236}">
-                  <a16:creationId xmlns="" xmlns:a16="http://schemas.microsoft.com/office/drawing/2014/main" id="{E59B3FCE-0262-45FE-BE39-9459C5BC7FEE}"/>
+                  <a16:creationId xmlns:a16="http://schemas.microsoft.com/office/drawing/2014/main" xmlns="" id="{E59B3FCE-0262-45FE-BE39-9459C5BC7FEE}"/>
                 </a:ext>
               </a:extLst>
             </p:cNvPr>
@@ -16664,7 +16664,7 @@
             <p:cNvPr id="22" name="Rectangle 21">
               <a:extLst>
                 <a:ext uri="{FF2B5EF4-FFF2-40B4-BE49-F238E27FC236}">
-                  <a16:creationId xmlns="" xmlns:a16="http://schemas.microsoft.com/office/drawing/2014/main" id="{F5D692DE-D6DE-4022-9F2F-5F8C1403E4D0}"/>
+                  <a16:creationId xmlns:a16="http://schemas.microsoft.com/office/drawing/2014/main" xmlns="" id="{F5D692DE-D6DE-4022-9F2F-5F8C1403E4D0}"/>
                 </a:ext>
               </a:extLst>
             </p:cNvPr>
@@ -16724,7 +16724,7 @@
             <p:cNvPr id="23" name="Rectangle 22">
               <a:extLst>
                 <a:ext uri="{FF2B5EF4-FFF2-40B4-BE49-F238E27FC236}">
-                  <a16:creationId xmlns="" xmlns:a16="http://schemas.microsoft.com/office/drawing/2014/main" id="{35EEF2F0-E01D-4851-96E7-30214EC78A3B}"/>
+                  <a16:creationId xmlns:a16="http://schemas.microsoft.com/office/drawing/2014/main" xmlns="" id="{35EEF2F0-E01D-4851-96E7-30214EC78A3B}"/>
                 </a:ext>
               </a:extLst>
             </p:cNvPr>
@@ -16784,7 +16784,7 @@
             <p:cNvPr id="24" name="Rectangle 23">
               <a:extLst>
                 <a:ext uri="{FF2B5EF4-FFF2-40B4-BE49-F238E27FC236}">
-                  <a16:creationId xmlns="" xmlns:a16="http://schemas.microsoft.com/office/drawing/2014/main" id="{468B1DDD-74B0-4453-A996-5BA8693FF545}"/>
+                  <a16:creationId xmlns:a16="http://schemas.microsoft.com/office/drawing/2014/main" xmlns="" id="{468B1DDD-74B0-4453-A996-5BA8693FF545}"/>
                 </a:ext>
               </a:extLst>
             </p:cNvPr>
@@ -16844,7 +16844,7 @@
             <p:cNvPr id="25" name="Rectangle 24">
               <a:extLst>
                 <a:ext uri="{FF2B5EF4-FFF2-40B4-BE49-F238E27FC236}">
-                  <a16:creationId xmlns="" xmlns:a16="http://schemas.microsoft.com/office/drawing/2014/main" id="{8809D5E9-1B2A-4D30-A4DD-47B7C9BBCEDC}"/>
+                  <a16:creationId xmlns:a16="http://schemas.microsoft.com/office/drawing/2014/main" xmlns="" id="{8809D5E9-1B2A-4D30-A4DD-47B7C9BBCEDC}"/>
                 </a:ext>
               </a:extLst>
             </p:cNvPr>
@@ -16904,7 +16904,7 @@
             <p:cNvPr id="26" name="Rectangle 25">
               <a:extLst>
                 <a:ext uri="{FF2B5EF4-FFF2-40B4-BE49-F238E27FC236}">
-                  <a16:creationId xmlns="" xmlns:a16="http://schemas.microsoft.com/office/drawing/2014/main" id="{995FF3A0-94CA-40BA-AF81-B777FF5FD489}"/>
+                  <a16:creationId xmlns:a16="http://schemas.microsoft.com/office/drawing/2014/main" xmlns="" id="{995FF3A0-94CA-40BA-AF81-B777FF5FD489}"/>
                 </a:ext>
               </a:extLst>
             </p:cNvPr>
@@ -16964,7 +16964,7 @@
             <p:cNvPr id="27" name="Rectangle 26">
               <a:extLst>
                 <a:ext uri="{FF2B5EF4-FFF2-40B4-BE49-F238E27FC236}">
-                  <a16:creationId xmlns="" xmlns:a16="http://schemas.microsoft.com/office/drawing/2014/main" id="{9F83F12C-5135-43B7-B1D8-A0A72DB85AED}"/>
+                  <a16:creationId xmlns:a16="http://schemas.microsoft.com/office/drawing/2014/main" xmlns="" id="{9F83F12C-5135-43B7-B1D8-A0A72DB85AED}"/>
                 </a:ext>
               </a:extLst>
             </p:cNvPr>
@@ -17024,7 +17024,7 @@
             <p:cNvPr id="28" name="Rectangle 27">
               <a:extLst>
                 <a:ext uri="{FF2B5EF4-FFF2-40B4-BE49-F238E27FC236}">
-                  <a16:creationId xmlns="" xmlns:a16="http://schemas.microsoft.com/office/drawing/2014/main" id="{256CA1CF-2C4A-42DA-94F5-CB5E5B47F24B}"/>
+                  <a16:creationId xmlns:a16="http://schemas.microsoft.com/office/drawing/2014/main" xmlns="" id="{256CA1CF-2C4A-42DA-94F5-CB5E5B47F24B}"/>
                 </a:ext>
               </a:extLst>
             </p:cNvPr>
@@ -17084,7 +17084,7 @@
             <p:cNvPr id="29" name="Rectangle 28">
               <a:extLst>
                 <a:ext uri="{FF2B5EF4-FFF2-40B4-BE49-F238E27FC236}">
-                  <a16:creationId xmlns="" xmlns:a16="http://schemas.microsoft.com/office/drawing/2014/main" id="{47F07AFA-8569-4B3B-854A-60B26629D96D}"/>
+                  <a16:creationId xmlns:a16="http://schemas.microsoft.com/office/drawing/2014/main" xmlns="" id="{47F07AFA-8569-4B3B-854A-60B26629D96D}"/>
                 </a:ext>
               </a:extLst>
             </p:cNvPr>
@@ -17144,7 +17144,7 @@
             <p:cNvPr id="30" name="Rectangle 29">
               <a:extLst>
                 <a:ext uri="{FF2B5EF4-FFF2-40B4-BE49-F238E27FC236}">
-                  <a16:creationId xmlns="" xmlns:a16="http://schemas.microsoft.com/office/drawing/2014/main" id="{8103554C-8B73-4C9A-AFFF-55D6E47A0E76}"/>
+                  <a16:creationId xmlns:a16="http://schemas.microsoft.com/office/drawing/2014/main" xmlns="" id="{8103554C-8B73-4C9A-AFFF-55D6E47A0E76}"/>
                 </a:ext>
               </a:extLst>
             </p:cNvPr>
@@ -17529,7 +17529,7 @@
   </p:txStyles>
   <p:extLst mod="1">
     <p:ext uri="{27BBF7A9-308A-43DC-89C8-2F10F3537804}">
-      <p15:sldGuideLst xmlns="" xmlns:p15="http://schemas.microsoft.com/office/powerpoint/2012/main">
+      <p15:sldGuideLst xmlns:p15="http://schemas.microsoft.com/office/powerpoint/2012/main" xmlns="">
         <p15:guide id="1" orient="horz" pos="709">
           <p15:clr>
             <a:srgbClr val="F26B43"/>
@@ -17622,7 +17622,7 @@
           <p:cNvPr id="2" name="Freeform 5">
             <a:extLst>
               <a:ext uri="{FF2B5EF4-FFF2-40B4-BE49-F238E27FC236}">
-                <a16:creationId xmlns="" xmlns:a16="http://schemas.microsoft.com/office/drawing/2014/main" id="{097E2B3C-7165-47CD-8F90-29BD547B5A2B}"/>
+                <a16:creationId xmlns:a16="http://schemas.microsoft.com/office/drawing/2014/main" xmlns="" id="{097E2B3C-7165-47CD-8F90-29BD547B5A2B}"/>
               </a:ext>
             </a:extLst>
           </p:cNvPr>
@@ -17735,7 +17735,7 @@
           <p:cNvPr id="7" name="Espace réservé du texte 1">
             <a:extLst>
               <a:ext uri="{FF2B5EF4-FFF2-40B4-BE49-F238E27FC236}">
-                <a16:creationId xmlns="" xmlns:a16="http://schemas.microsoft.com/office/drawing/2014/main" id="{3E61A40D-4439-4E82-955B-FC636EF3CC80}"/>
+                <a16:creationId xmlns:a16="http://schemas.microsoft.com/office/drawing/2014/main" xmlns="" id="{3E61A40D-4439-4E82-955B-FC636EF3CC80}"/>
               </a:ext>
             </a:extLst>
           </p:cNvPr>
@@ -17977,7 +17977,7 @@
           <p:cNvPr id="8" name="Sous-titre 2">
             <a:extLst>
               <a:ext uri="{FF2B5EF4-FFF2-40B4-BE49-F238E27FC236}">
-                <a16:creationId xmlns="" xmlns:a16="http://schemas.microsoft.com/office/drawing/2014/main" id="{259864C7-43B5-4E4E-B76F-BA3BD78F03AA}"/>
+                <a16:creationId xmlns:a16="http://schemas.microsoft.com/office/drawing/2014/main" xmlns="" id="{259864C7-43B5-4E4E-B76F-BA3BD78F03AA}"/>
               </a:ext>
             </a:extLst>
           </p:cNvPr>
@@ -18350,7 +18350,7 @@
           <p:cNvPr id="9" name="Espace réservé du texte 1">
             <a:extLst>
               <a:ext uri="{FF2B5EF4-FFF2-40B4-BE49-F238E27FC236}">
-                <a16:creationId xmlns="" xmlns:a16="http://schemas.microsoft.com/office/drawing/2014/main" id="{3E61A40D-4439-4E82-955B-FC636EF3CC80}"/>
+                <a16:creationId xmlns:a16="http://schemas.microsoft.com/office/drawing/2014/main" xmlns="" id="{3E61A40D-4439-4E82-955B-FC636EF3CC80}"/>
               </a:ext>
             </a:extLst>
           </p:cNvPr>
@@ -18630,7 +18630,11 @@
           <a:p>
             <a:r>
               <a:rPr lang="es-ES" dirty="0" smtClean="0"/>
-              <a:t>Objetivos del curso</a:t>
+              <a:t>1.1 Objetivos </a:t>
+            </a:r>
+            <a:r>
+              <a:rPr lang="es-ES" dirty="0" smtClean="0"/>
+              <a:t>del curso</a:t>
             </a:r>
             <a:endParaRPr lang="es-ES" dirty="0"/>
           </a:p>
@@ -18950,7 +18954,11 @@
           <a:p>
             <a:r>
               <a:rPr lang="es-ES" dirty="0" smtClean="0"/>
-              <a:t>Ejemplos de digitalización en Ingeniería </a:t>
+              <a:t>1.2 Ejemplos </a:t>
+            </a:r>
+            <a:r>
+              <a:rPr lang="es-ES" dirty="0" smtClean="0"/>
+              <a:t>de digitalización en Ingeniería </a:t>
             </a:r>
             <a:endParaRPr lang="es-ES" dirty="0"/>
           </a:p>
@@ -19864,7 +19872,11 @@
           <a:p>
             <a:r>
               <a:rPr lang="es-ES" dirty="0" smtClean="0"/>
-              <a:t>Historia de Python</a:t>
+              <a:t>1.3 Historia </a:t>
+            </a:r>
+            <a:r>
+              <a:rPr lang="es-ES" dirty="0" smtClean="0"/>
+              <a:t>de Python</a:t>
             </a:r>
             <a:endParaRPr lang="es-ES" dirty="0"/>
           </a:p>
@@ -20113,7 +20125,11 @@
           <a:p>
             <a:r>
               <a:rPr lang="es-ES" dirty="0" smtClean="0"/>
-              <a:t>Características de Python</a:t>
+              <a:t>1.4 Características </a:t>
+            </a:r>
+            <a:r>
+              <a:rPr lang="es-ES" dirty="0" smtClean="0"/>
+              <a:t>de Python</a:t>
             </a:r>
             <a:endParaRPr lang="es-ES" dirty="0"/>
           </a:p>
@@ -20683,7 +20699,7 @@
   <a:extraClrSchemeLst/>
   <a:extLst>
     <a:ext uri="{05A4C25C-085E-4340-85A3-A5531E510DB2}">
-      <thm15:themeFamily xmlns="" xmlns:thm15="http://schemas.microsoft.com/office/thememl/2012/main" name="Presentación1" id="{052EE8AA-76EF-4748-835F-A6D187923361}" vid="{370F8B8F-388E-40AB-AD36-3D6D6E70E5A2}"/>
+      <thm15:themeFamily xmlns:thm15="http://schemas.microsoft.com/office/thememl/2012/main" xmlns="" name="Presentación1" id="{052EE8AA-76EF-4748-835F-A6D187923361}" vid="{370F8B8F-388E-40AB-AD36-3D6D6E70E5A2}"/>
     </a:ext>
   </a:extLst>
 </a:theme>
@@ -20884,7 +20900,7 @@
   <a:extraClrSchemeLst/>
   <a:extLst>
     <a:ext uri="{05A4C25C-085E-4340-85A3-A5531E510DB2}">
-      <thm15:themeFamily xmlns="" xmlns:thm15="http://schemas.microsoft.com/office/thememl/2012/main" name="Presentación1" id="{052EE8AA-76EF-4748-835F-A6D187923361}" vid="{370F8B8F-388E-40AB-AD36-3D6D6E70E5A2}"/>
+      <thm15:themeFamily xmlns:thm15="http://schemas.microsoft.com/office/thememl/2012/main" xmlns="" name="Presentación1" id="{052EE8AA-76EF-4748-835F-A6D187923361}" vid="{370F8B8F-388E-40AB-AD36-3D6D6E70E5A2}"/>
     </a:ext>
   </a:extLst>
 </a:theme>

</xml_diff>